<commit_message>
staff can now delete bookings from database!, phew. Also made design look more like actual prototype
</commit_message>
<xml_diff>
--- a/Prototype Appearance.pptx
+++ b/Prototype Appearance.pptx
@@ -269,7 +269,7 @@
           <a:p>
             <a:fld id="{62B1FAF9-D10A-4FDD-8712-BF8787F450E7}" type="datetimeFigureOut">
               <a:rPr lang="en-GB" smtClean="0"/>
-              <a:t>27/02/2020</a:t>
+              <a:t>08/03/2020</a:t>
             </a:fld>
             <a:endParaRPr lang="en-GB"/>
           </a:p>
@@ -469,7 +469,7 @@
           <a:p>
             <a:fld id="{62B1FAF9-D10A-4FDD-8712-BF8787F450E7}" type="datetimeFigureOut">
               <a:rPr lang="en-GB" smtClean="0"/>
-              <a:t>27/02/2020</a:t>
+              <a:t>08/03/2020</a:t>
             </a:fld>
             <a:endParaRPr lang="en-GB"/>
           </a:p>
@@ -679,7 +679,7 @@
           <a:p>
             <a:fld id="{62B1FAF9-D10A-4FDD-8712-BF8787F450E7}" type="datetimeFigureOut">
               <a:rPr lang="en-GB" smtClean="0"/>
-              <a:t>27/02/2020</a:t>
+              <a:t>08/03/2020</a:t>
             </a:fld>
             <a:endParaRPr lang="en-GB"/>
           </a:p>
@@ -879,7 +879,7 @@
           <a:p>
             <a:fld id="{62B1FAF9-D10A-4FDD-8712-BF8787F450E7}" type="datetimeFigureOut">
               <a:rPr lang="en-GB" smtClean="0"/>
-              <a:t>27/02/2020</a:t>
+              <a:t>08/03/2020</a:t>
             </a:fld>
             <a:endParaRPr lang="en-GB"/>
           </a:p>
@@ -1155,7 +1155,7 @@
           <a:p>
             <a:fld id="{62B1FAF9-D10A-4FDD-8712-BF8787F450E7}" type="datetimeFigureOut">
               <a:rPr lang="en-GB" smtClean="0"/>
-              <a:t>27/02/2020</a:t>
+              <a:t>08/03/2020</a:t>
             </a:fld>
             <a:endParaRPr lang="en-GB"/>
           </a:p>
@@ -1423,7 +1423,7 @@
           <a:p>
             <a:fld id="{62B1FAF9-D10A-4FDD-8712-BF8787F450E7}" type="datetimeFigureOut">
               <a:rPr lang="en-GB" smtClean="0"/>
-              <a:t>27/02/2020</a:t>
+              <a:t>08/03/2020</a:t>
             </a:fld>
             <a:endParaRPr lang="en-GB"/>
           </a:p>
@@ -1838,7 +1838,7 @@
           <a:p>
             <a:fld id="{62B1FAF9-D10A-4FDD-8712-BF8787F450E7}" type="datetimeFigureOut">
               <a:rPr lang="en-GB" smtClean="0"/>
-              <a:t>27/02/2020</a:t>
+              <a:t>08/03/2020</a:t>
             </a:fld>
             <a:endParaRPr lang="en-GB"/>
           </a:p>
@@ -1980,7 +1980,7 @@
           <a:p>
             <a:fld id="{62B1FAF9-D10A-4FDD-8712-BF8787F450E7}" type="datetimeFigureOut">
               <a:rPr lang="en-GB" smtClean="0"/>
-              <a:t>27/02/2020</a:t>
+              <a:t>08/03/2020</a:t>
             </a:fld>
             <a:endParaRPr lang="en-GB"/>
           </a:p>
@@ -2093,7 +2093,7 @@
           <a:p>
             <a:fld id="{62B1FAF9-D10A-4FDD-8712-BF8787F450E7}" type="datetimeFigureOut">
               <a:rPr lang="en-GB" smtClean="0"/>
-              <a:t>27/02/2020</a:t>
+              <a:t>08/03/2020</a:t>
             </a:fld>
             <a:endParaRPr lang="en-GB"/>
           </a:p>
@@ -2406,7 +2406,7 @@
           <a:p>
             <a:fld id="{62B1FAF9-D10A-4FDD-8712-BF8787F450E7}" type="datetimeFigureOut">
               <a:rPr lang="en-GB" smtClean="0"/>
-              <a:t>27/02/2020</a:t>
+              <a:t>08/03/2020</a:t>
             </a:fld>
             <a:endParaRPr lang="en-GB"/>
           </a:p>
@@ -2695,7 +2695,7 @@
           <a:p>
             <a:fld id="{62B1FAF9-D10A-4FDD-8712-BF8787F450E7}" type="datetimeFigureOut">
               <a:rPr lang="en-GB" smtClean="0"/>
-              <a:t>27/02/2020</a:t>
+              <a:t>08/03/2020</a:t>
             </a:fld>
             <a:endParaRPr lang="en-GB"/>
           </a:p>
@@ -2938,7 +2938,7 @@
           <a:p>
             <a:fld id="{62B1FAF9-D10A-4FDD-8712-BF8787F450E7}" type="datetimeFigureOut">
               <a:rPr lang="en-GB" smtClean="0"/>
-              <a:t>27/02/2020</a:t>
+              <a:t>08/03/2020</a:t>
             </a:fld>
             <a:endParaRPr lang="en-GB"/>
           </a:p>
@@ -3840,6 +3840,63 @@
           </a:p>
         </p:txBody>
       </p:sp>
+      <p:sp>
+        <p:nvSpPr>
+          <p:cNvPr id="7" name="Rectangle 6">
+            <a:extLst>
+              <a:ext uri="{FF2B5EF4-FFF2-40B4-BE49-F238E27FC236}">
+                <a16:creationId xmlns:a16="http://schemas.microsoft.com/office/drawing/2014/main" id="{ECEA4267-D197-4D91-8C64-D69E1CC54CF4}"/>
+              </a:ext>
+            </a:extLst>
+          </p:cNvPr>
+          <p:cNvSpPr/>
+          <p:nvPr/>
+        </p:nvSpPr>
+        <p:spPr>
+          <a:xfrm>
+            <a:off x="6117643" y="3442939"/>
+            <a:ext cx="2643963" cy="680007"/>
+          </a:xfrm>
+          <a:prstGeom prst="rect">
+            <a:avLst/>
+          </a:prstGeom>
+          <a:noFill/>
+          <a:ln w="38100" cap="flat" cmpd="sng" algn="ctr">
+            <a:solidFill>
+              <a:schemeClr val="dk1"/>
+            </a:solidFill>
+            <a:prstDash val="solid"/>
+            <a:round/>
+            <a:headEnd type="none" w="med" len="med"/>
+            <a:tailEnd type="none" w="med" len="med"/>
+          </a:ln>
+        </p:spPr>
+        <p:style>
+          <a:lnRef idx="0">
+            <a:scrgbClr r="0" g="0" b="0"/>
+          </a:lnRef>
+          <a:fillRef idx="0">
+            <a:scrgbClr r="0" g="0" b="0"/>
+          </a:fillRef>
+          <a:effectRef idx="0">
+            <a:scrgbClr r="0" g="0" b="0"/>
+          </a:effectRef>
+          <a:fontRef idx="minor">
+            <a:schemeClr val="dk1"/>
+          </a:fontRef>
+        </p:style>
+        <p:txBody>
+          <a:bodyPr rtlCol="0" anchor="ctr"/>
+          <a:lstStyle/>
+          <a:p>
+            <a:pPr algn="ctr"/>
+            <a:r>
+              <a:rPr lang="en-GB" dirty="0"/>
+              <a:t>Return to main menu</a:t>
+            </a:r>
+          </a:p>
+        </p:txBody>
+      </p:sp>
     </p:spTree>
     <p:extLst>
       <p:ext uri="{BB962C8B-B14F-4D97-AF65-F5344CB8AC3E}">
@@ -4977,8 +5034,8 @@
         </p:nvSpPr>
         <p:spPr>
           <a:xfrm>
-            <a:off x="4532273" y="1624705"/>
-            <a:ext cx="3472425" cy="707886"/>
+            <a:off x="3483649" y="1732928"/>
+            <a:ext cx="6107762" cy="707886"/>
           </a:xfrm>
           <a:prstGeom prst="rect">
             <a:avLst/>
@@ -4995,71 +5052,17 @@
               <a:rPr lang="en-GB" sz="4000" dirty="0">
                 <a:latin typeface="Bahnschrift" panose="020B0502040204020203" pitchFamily="34" charset="0"/>
               </a:rPr>
-              <a:t>View calendar</a:t>
-            </a:r>
-          </a:p>
-        </p:txBody>
-      </p:sp>
-      <p:sp>
-        <p:nvSpPr>
-          <p:cNvPr id="7" name="TextBox 6">
-            <a:extLst>
-              <a:ext uri="{FF2B5EF4-FFF2-40B4-BE49-F238E27FC236}">
-                <a16:creationId xmlns:a16="http://schemas.microsoft.com/office/drawing/2014/main" id="{2661105B-D7E8-442D-ABBA-0DD738D31EF4}"/>
-              </a:ext>
-            </a:extLst>
-          </p:cNvPr>
-          <p:cNvSpPr txBox="1"/>
-          <p:nvPr/>
-        </p:nvSpPr>
-        <p:spPr>
-          <a:xfrm>
-            <a:off x="4990084" y="2330212"/>
-            <a:ext cx="2211831" cy="584775"/>
-          </a:xfrm>
-          <a:prstGeom prst="rect">
-            <a:avLst/>
-          </a:prstGeom>
-          <a:noFill/>
-        </p:spPr>
-        <p:txBody>
-          <a:bodyPr wrap="square" rtlCol="0">
-            <a:spAutoFit/>
-          </a:bodyPr>
-          <a:lstStyle/>
-          <a:p>
-            <a:r>
-              <a:rPr lang="en-GB" sz="1600" dirty="0"/>
-              <a:t>e.g. 6</a:t>
-            </a:r>
-            <a:r>
-              <a:rPr lang="en-GB" sz="1600" baseline="30000" dirty="0"/>
-              <a:t>th</a:t>
-            </a:r>
-            <a:r>
-              <a:rPr lang="en-GB" sz="1600" dirty="0"/>
-              <a:t> – 12</a:t>
-            </a:r>
-            <a:r>
-              <a:rPr lang="en-GB" sz="1600" baseline="30000" dirty="0"/>
-              <a:t>th</a:t>
-            </a:r>
-            <a:r>
-              <a:rPr lang="en-GB" sz="1600" dirty="0"/>
-              <a:t> of January </a:t>
-            </a:r>
-          </a:p>
-          <a:p>
-            <a:endParaRPr lang="en-GB" sz="1600" dirty="0"/>
+              <a:t>View calendar (customer)</a:t>
+            </a:r>
           </a:p>
         </p:txBody>
       </p:sp>
       <p:graphicFrame>
         <p:nvGraphicFramePr>
-          <p:cNvPr id="4" name="Table 3">
-            <a:extLst>
-              <a:ext uri="{FF2B5EF4-FFF2-40B4-BE49-F238E27FC236}">
-                <a16:creationId xmlns:a16="http://schemas.microsoft.com/office/drawing/2014/main" id="{6DF20FC9-7C2F-438A-8693-67C993CDDB33}"/>
+          <p:cNvPr id="2" name="Table 1">
+            <a:extLst>
+              <a:ext uri="{FF2B5EF4-FFF2-40B4-BE49-F238E27FC236}">
+                <a16:creationId xmlns:a16="http://schemas.microsoft.com/office/drawing/2014/main" id="{C6919E88-F48F-4422-9481-AC0EB2D1A895}"/>
               </a:ext>
             </a:extLst>
           </p:cNvPr>
@@ -5067,12 +5070,16 @@
             <a:graphicFrameLocks noGrp="1"/>
           </p:cNvGraphicFramePr>
           <p:nvPr>
-            <p:extLst/>
+            <p:extLst>
+              <p:ext uri="{D42A27DB-BD31-4B8C-83A1-F6EECF244321}">
+                <p14:modId xmlns:p14="http://schemas.microsoft.com/office/powerpoint/2010/main" val="954532196"/>
+              </p:ext>
+            </p:extLst>
           </p:nvPr>
         </p:nvGraphicFramePr>
         <p:xfrm>
-          <a:off x="3073995" y="2776558"/>
-          <a:ext cx="6388983" cy="2172409"/>
+          <a:off x="2967408" y="2728786"/>
+          <a:ext cx="6739191" cy="2172409"/>
         </p:xfrm>
         <a:graphic>
           <a:graphicData uri="http://schemas.openxmlformats.org/drawingml/2006/table">
@@ -5081,52 +5088,10 @@
                 <a:tableStyleId>{073A0DAA-6AF3-43AB-8588-CEC1D06C72B9}</a:tableStyleId>
               </a:tblPr>
               <a:tblGrid>
-                <a:gridCol w="912712">
+                <a:gridCol w="6739191">
                   <a:extLst>
                     <a:ext uri="{9D8B030D-6E8A-4147-A177-3AD203B41FA5}">
-                      <a16:colId xmlns:a16="http://schemas.microsoft.com/office/drawing/2014/main" val="2932000240"/>
-                    </a:ext>
-                  </a:extLst>
-                </a:gridCol>
-                <a:gridCol w="912712">
-                  <a:extLst>
-                    <a:ext uri="{9D8B030D-6E8A-4147-A177-3AD203B41FA5}">
-                      <a16:colId xmlns:a16="http://schemas.microsoft.com/office/drawing/2014/main" val="476520448"/>
-                    </a:ext>
-                  </a:extLst>
-                </a:gridCol>
-                <a:gridCol w="1026404">
-                  <a:extLst>
-                    <a:ext uri="{9D8B030D-6E8A-4147-A177-3AD203B41FA5}">
-                      <a16:colId xmlns:a16="http://schemas.microsoft.com/office/drawing/2014/main" val="305605371"/>
-                    </a:ext>
-                  </a:extLst>
-                </a:gridCol>
-                <a:gridCol w="877555">
-                  <a:extLst>
-                    <a:ext uri="{9D8B030D-6E8A-4147-A177-3AD203B41FA5}">
-                      <a16:colId xmlns:a16="http://schemas.microsoft.com/office/drawing/2014/main" val="2551630072"/>
-                    </a:ext>
-                  </a:extLst>
-                </a:gridCol>
-                <a:gridCol w="834176">
-                  <a:extLst>
-                    <a:ext uri="{9D8B030D-6E8A-4147-A177-3AD203B41FA5}">
-                      <a16:colId xmlns:a16="http://schemas.microsoft.com/office/drawing/2014/main" val="1231823282"/>
-                    </a:ext>
-                  </a:extLst>
-                </a:gridCol>
-                <a:gridCol w="912712">
-                  <a:extLst>
-                    <a:ext uri="{9D8B030D-6E8A-4147-A177-3AD203B41FA5}">
-                      <a16:colId xmlns:a16="http://schemas.microsoft.com/office/drawing/2014/main" val="671444928"/>
-                    </a:ext>
-                  </a:extLst>
-                </a:gridCol>
-                <a:gridCol w="912712">
-                  <a:extLst>
-                    <a:ext uri="{9D8B030D-6E8A-4147-A177-3AD203B41FA5}">
-                      <a16:colId xmlns:a16="http://schemas.microsoft.com/office/drawing/2014/main" val="3576486945"/>
+                      <a16:colId xmlns:a16="http://schemas.microsoft.com/office/drawing/2014/main" val="849464729"/>
                     </a:ext>
                   </a:extLst>
                 </a:gridCol>
@@ -5139,85 +5104,7 @@
                     <a:p>
                       <a:r>
                         <a:rPr lang="en-GB" sz="1400" dirty="0"/>
-                        <a:t>Monday </a:t>
-                      </a:r>
-                    </a:p>
-                  </a:txBody>
-                  <a:tcPr marL="71897" marR="71897" marT="35948" marB="35948"/>
-                </a:tc>
-                <a:tc>
-                  <a:txBody>
-                    <a:bodyPr/>
-                    <a:lstStyle/>
-                    <a:p>
-                      <a:r>
-                        <a:rPr lang="en-GB" sz="1400" dirty="0"/>
-                        <a:t>Tuesday </a:t>
-                      </a:r>
-                    </a:p>
-                  </a:txBody>
-                  <a:tcPr marL="71897" marR="71897" marT="35948" marB="35948"/>
-                </a:tc>
-                <a:tc>
-                  <a:txBody>
-                    <a:bodyPr/>
-                    <a:lstStyle/>
-                    <a:p>
-                      <a:r>
-                        <a:rPr lang="en-GB" sz="1400" dirty="0"/>
-                        <a:t>Wednesday  </a:t>
-                      </a:r>
-                    </a:p>
-                  </a:txBody>
-                  <a:tcPr marL="71897" marR="71897" marT="35948" marB="35948"/>
-                </a:tc>
-                <a:tc>
-                  <a:txBody>
-                    <a:bodyPr/>
-                    <a:lstStyle/>
-                    <a:p>
-                      <a:r>
-                        <a:rPr lang="en-GB" sz="1400" dirty="0"/>
-                        <a:t>Thursday </a:t>
-                      </a:r>
-                    </a:p>
-                  </a:txBody>
-                  <a:tcPr marL="71897" marR="71897" marT="35948" marB="35948"/>
-                </a:tc>
-                <a:tc>
-                  <a:txBody>
-                    <a:bodyPr/>
-                    <a:lstStyle/>
-                    <a:p>
-                      <a:r>
-                        <a:rPr lang="en-GB" sz="1400" dirty="0"/>
-                        <a:t>Friday </a:t>
-                      </a:r>
-                    </a:p>
-                  </a:txBody>
-                  <a:tcPr marL="71897" marR="71897" marT="35948" marB="35948"/>
-                </a:tc>
-                <a:tc>
-                  <a:txBody>
-                    <a:bodyPr/>
-                    <a:lstStyle/>
-                    <a:p>
-                      <a:r>
-                        <a:rPr lang="en-GB" sz="1400" dirty="0"/>
-                        <a:t>Saturday </a:t>
-                      </a:r>
-                    </a:p>
-                  </a:txBody>
-                  <a:tcPr marL="71897" marR="71897" marT="35948" marB="35948"/>
-                </a:tc>
-                <a:tc>
-                  <a:txBody>
-                    <a:bodyPr/>
-                    <a:lstStyle/>
-                    <a:p>
-                      <a:r>
-                        <a:rPr lang="en-GB" sz="1400" dirty="0"/>
-                        <a:t>Sunday </a:t>
+                        <a:t>Dates Already Booked</a:t>
                       </a:r>
                     </a:p>
                   </a:txBody>
@@ -5225,7 +5112,7 @@
                 </a:tc>
                 <a:extLst>
                   <a:ext uri="{0D108BD9-81ED-4DB2-BD59-A6C34878D82A}">
-                    <a16:rowId xmlns:a16="http://schemas.microsoft.com/office/drawing/2014/main" val="4158989908"/>
+                    <a16:rowId xmlns:a16="http://schemas.microsoft.com/office/drawing/2014/main" val="1489205285"/>
                   </a:ext>
                 </a:extLst>
               </a:tr>
@@ -5235,80 +5122,29 @@
                     <a:bodyPr/>
                     <a:lstStyle/>
                     <a:p>
-                      <a:endParaRPr lang="en-GB" sz="1400" dirty="0"/>
-                    </a:p>
-                  </a:txBody>
-                  <a:tcPr marL="71897" marR="71897" marT="35948" marB="35948"/>
-                </a:tc>
-                <a:tc>
-                  <a:txBody>
-                    <a:bodyPr/>
-                    <a:lstStyle/>
-                    <a:p>
                       <a:r>
                         <a:rPr lang="en-GB" sz="1400" dirty="0"/>
-                        <a:t>Lucy and Johns wedding, 3PM – 10PM at St Johns Church </a:t>
+                        <a:t>05-03-2020</a:t>
                       </a:r>
                     </a:p>
-                  </a:txBody>
-                  <a:tcPr marL="71897" marR="71897" marT="35948" marB="35948"/>
-                </a:tc>
-                <a:tc>
-                  <a:txBody>
-                    <a:bodyPr/>
-                    <a:lstStyle/>
                     <a:p>
                       <a:endParaRPr lang="en-GB" sz="1400" dirty="0"/>
                     </a:p>
-                  </a:txBody>
-                  <a:tcPr marL="71897" marR="71897" marT="35948" marB="35948"/>
-                </a:tc>
-                <a:tc>
-                  <a:txBody>
-                    <a:bodyPr/>
-                    <a:lstStyle/>
                     <a:p>
                       <a:endParaRPr lang="en-GB" sz="1400" dirty="0"/>
                     </a:p>
-                  </a:txBody>
-                  <a:tcPr marL="71897" marR="71897" marT="35948" marB="35948"/>
-                </a:tc>
-                <a:tc>
-                  <a:txBody>
-                    <a:bodyPr/>
-                    <a:lstStyle/>
                     <a:p>
                       <a:r>
                         <a:rPr lang="en-GB" sz="1400" dirty="0"/>
-                        <a:t>Timmy’s birthday party </a:t>
+                        <a:t>01-23-2021</a:t>
                       </a:r>
-                    </a:p>
-                  </a:txBody>
-                  <a:tcPr marL="71897" marR="71897" marT="35948" marB="35948"/>
-                </a:tc>
-                <a:tc>
-                  <a:txBody>
-                    <a:bodyPr/>
-                    <a:lstStyle/>
-                    <a:p>
-                      <a:endParaRPr lang="en-GB" sz="1400" dirty="0"/>
-                    </a:p>
-                  </a:txBody>
-                  <a:tcPr marL="71897" marR="71897" marT="35948" marB="35948"/>
-                </a:tc>
-                <a:tc>
-                  <a:txBody>
-                    <a:bodyPr/>
-                    <a:lstStyle/>
-                    <a:p>
-                      <a:endParaRPr lang="en-GB" sz="1400" dirty="0"/>
                     </a:p>
                   </a:txBody>
                   <a:tcPr marL="71897" marR="71897" marT="35948" marB="35948"/>
                 </a:tc>
                 <a:extLst>
                   <a:ext uri="{0D108BD9-81ED-4DB2-BD59-A6C34878D82A}">
-                    <a16:rowId xmlns:a16="http://schemas.microsoft.com/office/drawing/2014/main" val="3915492699"/>
+                    <a16:rowId xmlns:a16="http://schemas.microsoft.com/office/drawing/2014/main" val="2997046614"/>
                   </a:ext>
                 </a:extLst>
               </a:tr>
@@ -5316,136 +5152,6 @@
           </a:graphicData>
         </a:graphic>
       </p:graphicFrame>
-      <p:sp>
-        <p:nvSpPr>
-          <p:cNvPr id="8" name="Arrow: Right 7">
-            <a:extLst>
-              <a:ext uri="{FF2B5EF4-FFF2-40B4-BE49-F238E27FC236}">
-                <a16:creationId xmlns:a16="http://schemas.microsoft.com/office/drawing/2014/main" id="{92F6C184-1174-4B4B-B58B-4D2A2071E324}"/>
-              </a:ext>
-            </a:extLst>
-          </p:cNvPr>
-          <p:cNvSpPr/>
-          <p:nvPr/>
-        </p:nvSpPr>
-        <p:spPr>
-          <a:xfrm>
-            <a:off x="9808535" y="2776558"/>
-            <a:ext cx="574158" cy="584775"/>
-          </a:xfrm>
-          <a:prstGeom prst="rightArrow">
-            <a:avLst/>
-          </a:prstGeom>
-        </p:spPr>
-        <p:style>
-          <a:lnRef idx="2">
-            <a:schemeClr val="dk1">
-              <a:shade val="50000"/>
-            </a:schemeClr>
-          </a:lnRef>
-          <a:fillRef idx="1">
-            <a:schemeClr val="dk1"/>
-          </a:fillRef>
-          <a:effectRef idx="0">
-            <a:schemeClr val="dk1"/>
-          </a:effectRef>
-          <a:fontRef idx="minor">
-            <a:schemeClr val="lt1"/>
-          </a:fontRef>
-        </p:style>
-        <p:txBody>
-          <a:bodyPr rtlCol="0" anchor="ctr"/>
-          <a:lstStyle/>
-          <a:p>
-            <a:pPr algn="ctr"/>
-            <a:endParaRPr lang="en-GB"/>
-          </a:p>
-        </p:txBody>
-      </p:sp>
-      <p:sp>
-        <p:nvSpPr>
-          <p:cNvPr id="9" name="Arrow: Right 8">
-            <a:extLst>
-              <a:ext uri="{FF2B5EF4-FFF2-40B4-BE49-F238E27FC236}">
-                <a16:creationId xmlns:a16="http://schemas.microsoft.com/office/drawing/2014/main" id="{A9B09FA8-DD74-4FD0-A7B7-01893F956BAC}"/>
-              </a:ext>
-            </a:extLst>
-          </p:cNvPr>
-          <p:cNvSpPr/>
-          <p:nvPr/>
-        </p:nvSpPr>
-        <p:spPr>
-          <a:xfrm rot="10800000">
-            <a:off x="2154279" y="2693163"/>
-            <a:ext cx="574158" cy="584775"/>
-          </a:xfrm>
-          <a:prstGeom prst="rightArrow">
-            <a:avLst/>
-          </a:prstGeom>
-        </p:spPr>
-        <p:style>
-          <a:lnRef idx="2">
-            <a:schemeClr val="dk1">
-              <a:shade val="50000"/>
-            </a:schemeClr>
-          </a:lnRef>
-          <a:fillRef idx="1">
-            <a:schemeClr val="dk1"/>
-          </a:fillRef>
-          <a:effectRef idx="0">
-            <a:schemeClr val="dk1"/>
-          </a:effectRef>
-          <a:fontRef idx="minor">
-            <a:schemeClr val="lt1"/>
-          </a:fontRef>
-        </p:style>
-        <p:txBody>
-          <a:bodyPr rtlCol="0" anchor="ctr"/>
-          <a:lstStyle/>
-          <a:p>
-            <a:pPr algn="ctr"/>
-            <a:endParaRPr lang="en-GB"/>
-          </a:p>
-        </p:txBody>
-      </p:sp>
-      <p:sp>
-        <p:nvSpPr>
-          <p:cNvPr id="10" name="TextBox 9">
-            <a:extLst>
-              <a:ext uri="{FF2B5EF4-FFF2-40B4-BE49-F238E27FC236}">
-                <a16:creationId xmlns:a16="http://schemas.microsoft.com/office/drawing/2014/main" id="{A604091A-F295-45DA-8F99-8152CE770DD8}"/>
-              </a:ext>
-            </a:extLst>
-          </p:cNvPr>
-          <p:cNvSpPr txBox="1"/>
-          <p:nvPr/>
-        </p:nvSpPr>
-        <p:spPr>
-          <a:xfrm>
-            <a:off x="4089990" y="5133135"/>
-            <a:ext cx="5192234" cy="584775"/>
-          </a:xfrm>
-          <a:prstGeom prst="rect">
-            <a:avLst/>
-          </a:prstGeom>
-          <a:noFill/>
-        </p:spPr>
-        <p:txBody>
-          <a:bodyPr wrap="square" rtlCol="0">
-            <a:spAutoFit/>
-          </a:bodyPr>
-          <a:lstStyle/>
-          <a:p>
-            <a:r>
-              <a:rPr lang="en-GB" sz="1600" dirty="0"/>
-              <a:t>Use arrows to look at previous or future bookings</a:t>
-            </a:r>
-          </a:p>
-          <a:p>
-            <a:endParaRPr lang="en-GB" sz="1600" dirty="0"/>
-          </a:p>
-        </p:txBody>
-      </p:sp>
     </p:spTree>
     <p:extLst>
       <p:ext uri="{BB962C8B-B14F-4D97-AF65-F5344CB8AC3E}">
@@ -5968,10 +5674,10 @@
       </p:sp>
       <p:sp>
         <p:nvSpPr>
-          <p:cNvPr id="12" name="Rectangle 11">
-            <a:extLst>
-              <a:ext uri="{FF2B5EF4-FFF2-40B4-BE49-F238E27FC236}">
-                <a16:creationId xmlns:a16="http://schemas.microsoft.com/office/drawing/2014/main" id="{2D157704-D9FC-43FF-BACE-431EE2DAD538}"/>
+          <p:cNvPr id="13" name="Rectangle 12">
+            <a:extLst>
+              <a:ext uri="{FF2B5EF4-FFF2-40B4-BE49-F238E27FC236}">
+                <a16:creationId xmlns:a16="http://schemas.microsoft.com/office/drawing/2014/main" id="{62264EAD-53CD-44DD-A48F-6A6244A0B1AB}"/>
               </a:ext>
             </a:extLst>
           </p:cNvPr>
@@ -5980,7 +5686,7 @@
         </p:nvSpPr>
         <p:spPr>
           <a:xfrm>
-            <a:off x="3395521" y="2408650"/>
+            <a:off x="6301562" y="2408649"/>
             <a:ext cx="2643963" cy="680007"/>
           </a:xfrm>
           <a:prstGeom prst="rect">
@@ -6018,17 +5724,17 @@
             <a:pPr algn="ctr"/>
             <a:r>
               <a:rPr lang="en-GB" dirty="0"/>
-              <a:t>View Database</a:t>
-            </a:r>
-          </a:p>
-        </p:txBody>
-      </p:sp>
-      <p:sp>
-        <p:nvSpPr>
-          <p:cNvPr id="13" name="Rectangle 12">
-            <a:extLst>
-              <a:ext uri="{FF2B5EF4-FFF2-40B4-BE49-F238E27FC236}">
-                <a16:creationId xmlns:a16="http://schemas.microsoft.com/office/drawing/2014/main" id="{62264EAD-53CD-44DD-A48F-6A6244A0B1AB}"/>
+              <a:t>Add Booking</a:t>
+            </a:r>
+          </a:p>
+        </p:txBody>
+      </p:sp>
+      <p:sp>
+        <p:nvSpPr>
+          <p:cNvPr id="16" name="Rectangle 15">
+            <a:extLst>
+              <a:ext uri="{FF2B5EF4-FFF2-40B4-BE49-F238E27FC236}">
+                <a16:creationId xmlns:a16="http://schemas.microsoft.com/office/drawing/2014/main" id="{1FAF163D-8944-4B56-B8E6-1E5B6BB22491}"/>
               </a:ext>
             </a:extLst>
           </p:cNvPr>
@@ -6037,7 +5743,7 @@
         </p:nvSpPr>
         <p:spPr>
           <a:xfrm>
-            <a:off x="6301562" y="2408649"/>
+            <a:off x="3402418" y="2401269"/>
             <a:ext cx="2643963" cy="680007"/>
           </a:xfrm>
           <a:prstGeom prst="rect">
@@ -6075,17 +5781,54 @@
             <a:pPr algn="ctr"/>
             <a:r>
               <a:rPr lang="en-GB" dirty="0"/>
-              <a:t>Add Booking</a:t>
-            </a:r>
-          </a:p>
-        </p:txBody>
-      </p:sp>
-      <p:sp>
-        <p:nvSpPr>
-          <p:cNvPr id="16" name="Rectangle 15">
-            <a:extLst>
-              <a:ext uri="{FF2B5EF4-FFF2-40B4-BE49-F238E27FC236}">
-                <a16:creationId xmlns:a16="http://schemas.microsoft.com/office/drawing/2014/main" id="{1FAF163D-8944-4B56-B8E6-1E5B6BB22491}"/>
+              <a:t>View Calendar</a:t>
+            </a:r>
+          </a:p>
+        </p:txBody>
+      </p:sp>
+      <p:sp>
+        <p:nvSpPr>
+          <p:cNvPr id="18" name="TextBox 17">
+            <a:extLst>
+              <a:ext uri="{FF2B5EF4-FFF2-40B4-BE49-F238E27FC236}">
+                <a16:creationId xmlns:a16="http://schemas.microsoft.com/office/drawing/2014/main" id="{F9797A64-4E6D-41B5-9B90-228C072253EB}"/>
+              </a:ext>
+            </a:extLst>
+          </p:cNvPr>
+          <p:cNvSpPr txBox="1"/>
+          <p:nvPr/>
+        </p:nvSpPr>
+        <p:spPr>
+          <a:xfrm>
+            <a:off x="4682564" y="1530641"/>
+            <a:ext cx="2983509" cy="707886"/>
+          </a:xfrm>
+          <a:prstGeom prst="rect">
+            <a:avLst/>
+          </a:prstGeom>
+          <a:noFill/>
+        </p:spPr>
+        <p:txBody>
+          <a:bodyPr wrap="none" rtlCol="0">
+            <a:spAutoFit/>
+          </a:bodyPr>
+          <a:lstStyle/>
+          <a:p>
+            <a:r>
+              <a:rPr lang="en-GB" sz="4000" dirty="0">
+                <a:latin typeface="Bahnschrift" panose="020B0502040204020203" pitchFamily="34" charset="0"/>
+              </a:rPr>
+              <a:t>Admin Menu</a:t>
+            </a:r>
+          </a:p>
+        </p:txBody>
+      </p:sp>
+      <p:sp>
+        <p:nvSpPr>
+          <p:cNvPr id="7" name="Rectangle 6">
+            <a:extLst>
+              <a:ext uri="{FF2B5EF4-FFF2-40B4-BE49-F238E27FC236}">
+                <a16:creationId xmlns:a16="http://schemas.microsoft.com/office/drawing/2014/main" id="{FA5369C2-1D4C-4690-8A30-C7EAEABA9618}"/>
               </a:ext>
             </a:extLst>
           </p:cNvPr>
@@ -6094,7 +5837,7 @@
         </p:nvSpPr>
         <p:spPr>
           <a:xfrm>
-            <a:off x="3402418" y="3290450"/>
+            <a:off x="6301561" y="3350005"/>
             <a:ext cx="2643963" cy="680007"/>
           </a:xfrm>
           <a:prstGeom prst="rect">
@@ -6132,44 +5875,64 @@
             <a:pPr algn="ctr"/>
             <a:r>
               <a:rPr lang="en-GB" dirty="0"/>
-              <a:t>View Calendar</a:t>
-            </a:r>
-          </a:p>
-        </p:txBody>
-      </p:sp>
-      <p:sp>
-        <p:nvSpPr>
-          <p:cNvPr id="18" name="TextBox 17">
-            <a:extLst>
-              <a:ext uri="{FF2B5EF4-FFF2-40B4-BE49-F238E27FC236}">
-                <a16:creationId xmlns:a16="http://schemas.microsoft.com/office/drawing/2014/main" id="{F9797A64-4E6D-41B5-9B90-228C072253EB}"/>
-              </a:ext>
-            </a:extLst>
-          </p:cNvPr>
-          <p:cNvSpPr txBox="1"/>
+              <a:t>Return to main menu</a:t>
+            </a:r>
+          </a:p>
+        </p:txBody>
+      </p:sp>
+      <p:sp>
+        <p:nvSpPr>
+          <p:cNvPr id="8" name="Rectangle 7">
+            <a:extLst>
+              <a:ext uri="{FF2B5EF4-FFF2-40B4-BE49-F238E27FC236}">
+                <a16:creationId xmlns:a16="http://schemas.microsoft.com/office/drawing/2014/main" id="{04045761-3F54-48A3-836F-BE6FBC95DB6F}"/>
+              </a:ext>
+            </a:extLst>
+          </p:cNvPr>
+          <p:cNvSpPr/>
           <p:nvPr/>
         </p:nvSpPr>
         <p:spPr>
           <a:xfrm>
-            <a:off x="4682564" y="1530641"/>
-            <a:ext cx="2983509" cy="707886"/>
+            <a:off x="3402418" y="3342625"/>
+            <a:ext cx="2643963" cy="680007"/>
           </a:xfrm>
           <a:prstGeom prst="rect">
             <a:avLst/>
           </a:prstGeom>
           <a:noFill/>
-        </p:spPr>
-        <p:txBody>
-          <a:bodyPr wrap="none" rtlCol="0">
-            <a:spAutoFit/>
-          </a:bodyPr>
-          <a:lstStyle/>
-          <a:p>
-            <a:r>
-              <a:rPr lang="en-GB" sz="4000" dirty="0">
-                <a:latin typeface="Bahnschrift" panose="020B0502040204020203" pitchFamily="34" charset="0"/>
-              </a:rPr>
-              <a:t>Admin Menu</a:t>
+          <a:ln w="38100" cap="flat" cmpd="sng" algn="ctr">
+            <a:solidFill>
+              <a:schemeClr val="dk1"/>
+            </a:solidFill>
+            <a:prstDash val="solid"/>
+            <a:round/>
+            <a:headEnd type="none" w="med" len="med"/>
+            <a:tailEnd type="none" w="med" len="med"/>
+          </a:ln>
+        </p:spPr>
+        <p:style>
+          <a:lnRef idx="0">
+            <a:scrgbClr r="0" g="0" b="0"/>
+          </a:lnRef>
+          <a:fillRef idx="0">
+            <a:scrgbClr r="0" g="0" b="0"/>
+          </a:fillRef>
+          <a:effectRef idx="0">
+            <a:scrgbClr r="0" g="0" b="0"/>
+          </a:effectRef>
+          <a:fontRef idx="minor">
+            <a:schemeClr val="dk1"/>
+          </a:fontRef>
+        </p:style>
+        <p:txBody>
+          <a:bodyPr rtlCol="0" anchor="ctr"/>
+          <a:lstStyle/>
+          <a:p>
+            <a:pPr algn="ctr"/>
+            <a:r>
+              <a:rPr lang="en-GB" dirty="0"/>
+              <a:t>Remove Booking</a:t>
             </a:r>
           </a:p>
         </p:txBody>
@@ -6308,12 +6071,16 @@
             <a:graphicFrameLocks noGrp="1"/>
           </p:cNvGraphicFramePr>
           <p:nvPr>
-            <p:extLst/>
+            <p:extLst>
+              <p:ext uri="{D42A27DB-BD31-4B8C-83A1-F6EECF244321}">
+                <p14:modId xmlns:p14="http://schemas.microsoft.com/office/powerpoint/2010/main" val="666439698"/>
+              </p:ext>
+            </p:extLst>
           </p:nvPr>
         </p:nvGraphicFramePr>
         <p:xfrm>
           <a:off x="530449" y="1506475"/>
-          <a:ext cx="10690272" cy="4175064"/>
+          <a:ext cx="10690272" cy="4166723"/>
         </p:xfrm>
         <a:graphic>
           <a:graphicData uri="http://schemas.openxmlformats.org/drawingml/2006/table">
@@ -6593,14 +6360,6 @@
                     <a:bodyPr/>
                     <a:lstStyle/>
                     <a:p>
-                      <a:r>
-                        <a:rPr lang="en-GB" sz="1200" dirty="0"/>
-                        <a:t>john </a:t>
-                      </a:r>
-                      <a:r>
-                        <a:rPr lang="en-GB" sz="1200" dirty="0" err="1"/>
-                        <a:t>willson</a:t>
-                      </a:r>
                       <a:endParaRPr lang="en-GB" sz="1200" dirty="0"/>
                     </a:p>
                   </a:txBody>
@@ -9185,10 +8944,10 @@
       </p:grpSpPr>
       <p:sp>
         <p:nvSpPr>
-          <p:cNvPr id="5" name="Rectangle 4">
-            <a:extLst>
-              <a:ext uri="{FF2B5EF4-FFF2-40B4-BE49-F238E27FC236}">
-                <a16:creationId xmlns:a16="http://schemas.microsoft.com/office/drawing/2014/main" id="{0402379C-AC43-4A5C-9991-593BA47D8D89}"/>
+          <p:cNvPr id="9" name="Rectangle 8">
+            <a:extLst>
+              <a:ext uri="{FF2B5EF4-FFF2-40B4-BE49-F238E27FC236}">
+                <a16:creationId xmlns:a16="http://schemas.microsoft.com/office/drawing/2014/main" id="{B472F3FE-0FBA-484F-9D1E-66555F4681A0}"/>
               </a:ext>
             </a:extLst>
           </p:cNvPr>
@@ -9197,7 +8956,7 @@
         </p:nvSpPr>
         <p:spPr>
           <a:xfrm>
-            <a:off x="1704753" y="1501406"/>
+            <a:off x="1945758" y="1520456"/>
             <a:ext cx="8782493" cy="4136065"/>
           </a:xfrm>
           <a:prstGeom prst="rect">
@@ -9239,10 +8998,10 @@
       </p:sp>
       <p:sp>
         <p:nvSpPr>
-          <p:cNvPr id="6" name="TextBox 5">
-            <a:extLst>
-              <a:ext uri="{FF2B5EF4-FFF2-40B4-BE49-F238E27FC236}">
-                <a16:creationId xmlns:a16="http://schemas.microsoft.com/office/drawing/2014/main" id="{797A2AE5-4625-4EBE-9779-99E6D4F62DE6}"/>
+          <p:cNvPr id="15" name="TextBox 14">
+            <a:extLst>
+              <a:ext uri="{FF2B5EF4-FFF2-40B4-BE49-F238E27FC236}">
+                <a16:creationId xmlns:a16="http://schemas.microsoft.com/office/drawing/2014/main" id="{E3E1B972-A4AE-4953-A603-30F45D5F000C}"/>
               </a:ext>
             </a:extLst>
           </p:cNvPr>
@@ -9251,8 +9010,8 @@
         </p:nvSpPr>
         <p:spPr>
           <a:xfrm>
-            <a:off x="4291268" y="1605655"/>
-            <a:ext cx="3472425" cy="707886"/>
+            <a:off x="3794042" y="1622326"/>
+            <a:ext cx="5325497" cy="707886"/>
           </a:xfrm>
           <a:prstGeom prst="rect">
             <a:avLst/>
@@ -9269,71 +9028,17 @@
               <a:rPr lang="en-GB" sz="4000" dirty="0">
                 <a:latin typeface="Bahnschrift" panose="020B0502040204020203" pitchFamily="34" charset="0"/>
               </a:rPr>
-              <a:t>View calendar</a:t>
-            </a:r>
-          </a:p>
-        </p:txBody>
-      </p:sp>
-      <p:sp>
-        <p:nvSpPr>
-          <p:cNvPr id="10" name="TextBox 9">
-            <a:extLst>
-              <a:ext uri="{FF2B5EF4-FFF2-40B4-BE49-F238E27FC236}">
-                <a16:creationId xmlns:a16="http://schemas.microsoft.com/office/drawing/2014/main" id="{3736C77A-5696-4E83-B526-A204543D89ED}"/>
-              </a:ext>
-            </a:extLst>
-          </p:cNvPr>
-          <p:cNvSpPr txBox="1"/>
-          <p:nvPr/>
-        </p:nvSpPr>
-        <p:spPr>
-          <a:xfrm>
-            <a:off x="4749079" y="2311162"/>
-            <a:ext cx="2211831" cy="584775"/>
-          </a:xfrm>
-          <a:prstGeom prst="rect">
-            <a:avLst/>
-          </a:prstGeom>
-          <a:noFill/>
-        </p:spPr>
-        <p:txBody>
-          <a:bodyPr wrap="square" rtlCol="0">
-            <a:spAutoFit/>
-          </a:bodyPr>
-          <a:lstStyle/>
-          <a:p>
-            <a:r>
-              <a:rPr lang="en-GB" sz="1600" dirty="0"/>
-              <a:t>e.g. 6</a:t>
-            </a:r>
-            <a:r>
-              <a:rPr lang="en-GB" sz="1600" baseline="30000" dirty="0"/>
-              <a:t>th</a:t>
-            </a:r>
-            <a:r>
-              <a:rPr lang="en-GB" sz="1600" dirty="0"/>
-              <a:t> – 12</a:t>
-            </a:r>
-            <a:r>
-              <a:rPr lang="en-GB" sz="1600" baseline="30000" dirty="0"/>
-              <a:t>th</a:t>
-            </a:r>
-            <a:r>
-              <a:rPr lang="en-GB" sz="1600" dirty="0"/>
-              <a:t> of January </a:t>
-            </a:r>
-          </a:p>
-          <a:p>
-            <a:endParaRPr lang="en-GB" sz="1600" dirty="0"/>
+              <a:t>View calendar (admin)</a:t>
+            </a:r>
           </a:p>
         </p:txBody>
       </p:sp>
       <p:graphicFrame>
         <p:nvGraphicFramePr>
-          <p:cNvPr id="11" name="Table 10">
-            <a:extLst>
-              <a:ext uri="{FF2B5EF4-FFF2-40B4-BE49-F238E27FC236}">
-                <a16:creationId xmlns:a16="http://schemas.microsoft.com/office/drawing/2014/main" id="{420369FD-D560-4793-AF78-91C7938D79BD}"/>
+          <p:cNvPr id="17" name="Table 16">
+            <a:extLst>
+              <a:ext uri="{FF2B5EF4-FFF2-40B4-BE49-F238E27FC236}">
+                <a16:creationId xmlns:a16="http://schemas.microsoft.com/office/drawing/2014/main" id="{F3DDD78C-F58E-489C-9169-80D99FA0A31F}"/>
               </a:ext>
             </a:extLst>
           </p:cNvPr>
@@ -9341,12 +9046,16 @@
             <a:graphicFrameLocks noGrp="1"/>
           </p:cNvGraphicFramePr>
           <p:nvPr>
-            <p:extLst/>
+            <p:extLst>
+              <p:ext uri="{D42A27DB-BD31-4B8C-83A1-F6EECF244321}">
+                <p14:modId xmlns:p14="http://schemas.microsoft.com/office/powerpoint/2010/main" val="3403973914"/>
+              </p:ext>
+            </p:extLst>
           </p:nvPr>
         </p:nvGraphicFramePr>
         <p:xfrm>
-          <a:off x="2832990" y="2757508"/>
-          <a:ext cx="6388983" cy="2172409"/>
+          <a:off x="2951215" y="2622599"/>
+          <a:ext cx="6634540" cy="2316653"/>
         </p:xfrm>
         <a:graphic>
           <a:graphicData uri="http://schemas.openxmlformats.org/drawingml/2006/table">
@@ -9355,21 +9064,21 @@
                 <a:tableStyleId>{073A0DAA-6AF3-43AB-8588-CEC1D06C72B9}</a:tableStyleId>
               </a:tblPr>
               <a:tblGrid>
-                <a:gridCol w="912712">
+                <a:gridCol w="983222">
                   <a:extLst>
                     <a:ext uri="{9D8B030D-6E8A-4147-A177-3AD203B41FA5}">
                       <a16:colId xmlns:a16="http://schemas.microsoft.com/office/drawing/2014/main" val="2932000240"/>
                     </a:ext>
                   </a:extLst>
                 </a:gridCol>
-                <a:gridCol w="912712">
+                <a:gridCol w="880844">
                   <a:extLst>
                     <a:ext uri="{9D8B030D-6E8A-4147-A177-3AD203B41FA5}">
                       <a16:colId xmlns:a16="http://schemas.microsoft.com/office/drawing/2014/main" val="476520448"/>
                     </a:ext>
                   </a:extLst>
                 </a:gridCol>
-                <a:gridCol w="1026404">
+                <a:gridCol w="987762">
                   <a:extLst>
                     <a:ext uri="{9D8B030D-6E8A-4147-A177-3AD203B41FA5}">
                       <a16:colId xmlns:a16="http://schemas.microsoft.com/office/drawing/2014/main" val="305605371"/>
@@ -9383,21 +9092,21 @@
                     </a:ext>
                   </a:extLst>
                 </a:gridCol>
-                <a:gridCol w="834176">
+                <a:gridCol w="973218">
                   <a:extLst>
                     <a:ext uri="{9D8B030D-6E8A-4147-A177-3AD203B41FA5}">
                       <a16:colId xmlns:a16="http://schemas.microsoft.com/office/drawing/2014/main" val="1231823282"/>
                     </a:ext>
                   </a:extLst>
                 </a:gridCol>
-                <a:gridCol w="912712">
+                <a:gridCol w="1185319">
                   <a:extLst>
                     <a:ext uri="{9D8B030D-6E8A-4147-A177-3AD203B41FA5}">
                       <a16:colId xmlns:a16="http://schemas.microsoft.com/office/drawing/2014/main" val="671444928"/>
                     </a:ext>
                   </a:extLst>
                 </a:gridCol>
-                <a:gridCol w="912712">
+                <a:gridCol w="746620">
                   <a:extLst>
                     <a:ext uri="{9D8B030D-6E8A-4147-A177-3AD203B41FA5}">
                       <a16:colId xmlns:a16="http://schemas.microsoft.com/office/drawing/2014/main" val="3576486945"/>
@@ -9413,7 +9122,7 @@
                     <a:p>
                       <a:r>
                         <a:rPr lang="en-GB" sz="1400" dirty="0"/>
-                        <a:t>Monday </a:t>
+                        <a:t>Date </a:t>
                       </a:r>
                     </a:p>
                   </a:txBody>
@@ -9426,7 +9135,7 @@
                     <a:p>
                       <a:r>
                         <a:rPr lang="en-GB" sz="1400" dirty="0"/>
-                        <a:t>Tuesday </a:t>
+                        <a:t>Surname </a:t>
                       </a:r>
                     </a:p>
                   </a:txBody>
@@ -9439,7 +9148,7 @@
                     <a:p>
                       <a:r>
                         <a:rPr lang="en-GB" sz="1400" dirty="0"/>
-                        <a:t>Wednesday  </a:t>
+                        <a:t>Location  </a:t>
                       </a:r>
                     </a:p>
                   </a:txBody>
@@ -9452,7 +9161,7 @@
                     <a:p>
                       <a:r>
                         <a:rPr lang="en-GB" sz="1400" dirty="0"/>
-                        <a:t>Thursday </a:t>
+                        <a:t>Menu Type </a:t>
                       </a:r>
                     </a:p>
                   </a:txBody>
@@ -9465,7 +9174,7 @@
                     <a:p>
                       <a:r>
                         <a:rPr lang="en-GB" sz="1400" dirty="0"/>
-                        <a:t>Friday </a:t>
+                        <a:t>Headcount </a:t>
                       </a:r>
                     </a:p>
                   </a:txBody>
@@ -9478,20 +9187,26 @@
                     <a:p>
                       <a:r>
                         <a:rPr lang="en-GB" sz="1400" dirty="0"/>
-                        <a:t>Saturday </a:t>
+                        <a:t>Dietary </a:t>
                       </a:r>
                     </a:p>
-                  </a:txBody>
-                  <a:tcPr marL="71897" marR="71897" marT="35948" marB="35948"/>
-                </a:tc>
-                <a:tc>
-                  <a:txBody>
-                    <a:bodyPr/>
-                    <a:lstStyle/>
                     <a:p>
                       <a:r>
                         <a:rPr lang="en-GB" sz="1400" dirty="0"/>
-                        <a:t>Sunday </a:t>
+                        <a:t>Requirements </a:t>
+                      </a:r>
+                    </a:p>
+                  </a:txBody>
+                  <a:tcPr marL="71897" marR="71897" marT="35948" marB="35948"/>
+                </a:tc>
+                <a:tc>
+                  <a:txBody>
+                    <a:bodyPr/>
+                    <a:lstStyle/>
+                    <a:p>
+                      <a:r>
+                        <a:rPr lang="en-GB" sz="1400" dirty="0"/>
+                        <a:t>Etc. </a:t>
                       </a:r>
                     </a:p>
                   </a:txBody>
@@ -9509,52 +9224,21 @@
                     <a:bodyPr/>
                     <a:lstStyle/>
                     <a:p>
-                      <a:endParaRPr lang="en-GB" sz="1400" dirty="0"/>
-                    </a:p>
-                  </a:txBody>
-                  <a:tcPr marL="71897" marR="71897" marT="35948" marB="35948"/>
-                </a:tc>
-                <a:tc>
-                  <a:txBody>
-                    <a:bodyPr/>
-                    <a:lstStyle/>
-                    <a:p>
                       <a:r>
                         <a:rPr lang="en-GB" sz="1400" dirty="0"/>
-                        <a:t>Lucy and Johns wedding, 3PM – 10PM at St Johns Church </a:t>
+                        <a:t>05-03-2020</a:t>
                       </a:r>
                     </a:p>
-                  </a:txBody>
-                  <a:tcPr marL="71897" marR="71897" marT="35948" marB="35948"/>
-                </a:tc>
-                <a:tc>
-                  <a:txBody>
-                    <a:bodyPr/>
-                    <a:lstStyle/>
                     <a:p>
                       <a:endParaRPr lang="en-GB" sz="1400" dirty="0"/>
                     </a:p>
-                  </a:txBody>
-                  <a:tcPr marL="71897" marR="71897" marT="35948" marB="35948"/>
-                </a:tc>
-                <a:tc>
-                  <a:txBody>
-                    <a:bodyPr/>
-                    <a:lstStyle/>
                     <a:p>
                       <a:endParaRPr lang="en-GB" sz="1400" dirty="0"/>
                     </a:p>
-                  </a:txBody>
-                  <a:tcPr marL="71897" marR="71897" marT="35948" marB="35948"/>
-                </a:tc>
-                <a:tc>
-                  <a:txBody>
-                    <a:bodyPr/>
-                    <a:lstStyle/>
                     <a:p>
                       <a:r>
                         <a:rPr lang="en-GB" sz="1400" dirty="0"/>
-                        <a:t>Timmy’s birthday party </a:t>
+                        <a:t>01-23-2021</a:t>
                       </a:r>
                     </a:p>
                   </a:txBody>
@@ -9565,7 +9249,116 @@
                     <a:bodyPr/>
                     <a:lstStyle/>
                     <a:p>
+                      <a:r>
+                        <a:rPr lang="en-GB" sz="1400" dirty="0"/>
+                        <a:t>Sinatra</a:t>
+                      </a:r>
+                    </a:p>
+                    <a:p>
                       <a:endParaRPr lang="en-GB" sz="1400" dirty="0"/>
+                    </a:p>
+                    <a:p>
+                      <a:endParaRPr lang="en-GB" sz="1400" dirty="0"/>
+                    </a:p>
+                    <a:p>
+                      <a:r>
+                        <a:rPr lang="en-GB" sz="1400" dirty="0"/>
+                        <a:t>Jones</a:t>
+                      </a:r>
+                    </a:p>
+                  </a:txBody>
+                  <a:tcPr marL="71897" marR="71897" marT="35948" marB="35948"/>
+                </a:tc>
+                <a:tc>
+                  <a:txBody>
+                    <a:bodyPr/>
+                    <a:lstStyle/>
+                    <a:p>
+                      <a:r>
+                        <a:rPr lang="en-GB" sz="1400" dirty="0"/>
+                        <a:t>Cardiff Castle</a:t>
+                      </a:r>
+                    </a:p>
+                    <a:p>
+                      <a:endParaRPr lang="en-GB" sz="1400" dirty="0"/>
+                    </a:p>
+                    <a:p>
+                      <a:r>
+                        <a:rPr lang="en-GB" sz="1400" dirty="0"/>
+                        <a:t>Bute park</a:t>
+                      </a:r>
+                    </a:p>
+                  </a:txBody>
+                  <a:tcPr marL="71897" marR="71897" marT="35948" marB="35948"/>
+                </a:tc>
+                <a:tc>
+                  <a:txBody>
+                    <a:bodyPr/>
+                    <a:lstStyle/>
+                    <a:p>
+                      <a:r>
+                        <a:rPr lang="en-GB" sz="1400" dirty="0"/>
+                        <a:t>Sweet basic</a:t>
+                      </a:r>
+                    </a:p>
+                    <a:p>
+                      <a:endParaRPr lang="en-GB" sz="1400" dirty="0"/>
+                    </a:p>
+                    <a:p>
+                      <a:r>
+                        <a:rPr lang="en-GB" sz="1400" dirty="0"/>
+                        <a:t>Sweet luxury</a:t>
+                      </a:r>
+                    </a:p>
+                  </a:txBody>
+                  <a:tcPr marL="71897" marR="71897" marT="35948" marB="35948"/>
+                </a:tc>
+                <a:tc>
+                  <a:txBody>
+                    <a:bodyPr/>
+                    <a:lstStyle/>
+                    <a:p>
+                      <a:r>
+                        <a:rPr lang="en-GB" sz="1400" dirty="0"/>
+                        <a:t>400</a:t>
+                      </a:r>
+                    </a:p>
+                    <a:p>
+                      <a:endParaRPr lang="en-GB" sz="1400" dirty="0"/>
+                    </a:p>
+                    <a:p>
+                      <a:endParaRPr lang="en-GB" sz="1400" dirty="0"/>
+                    </a:p>
+                    <a:p>
+                      <a:r>
+                        <a:rPr lang="en-GB" sz="1400" dirty="0"/>
+                        <a:t>200</a:t>
+                      </a:r>
+                    </a:p>
+                  </a:txBody>
+                  <a:tcPr marL="71897" marR="71897" marT="35948" marB="35948"/>
+                </a:tc>
+                <a:tc>
+                  <a:txBody>
+                    <a:bodyPr/>
+                    <a:lstStyle/>
+                    <a:p>
+                      <a:r>
+                        <a:rPr lang="en-GB" sz="1400" dirty="0"/>
+                        <a:t>Gluten free</a:t>
+                      </a:r>
+                    </a:p>
+                    <a:p>
+                      <a:endParaRPr lang="en-GB" sz="1400" dirty="0"/>
+                    </a:p>
+                    <a:p>
+                      <a:endParaRPr lang="en-GB" sz="1400" dirty="0"/>
+                    </a:p>
+                    <a:p>
+                      <a:r>
+                        <a:rPr lang="en-GB" sz="1400" dirty="0"/>
+                        <a:t>Vegan + Gluten free</a:t>
+                      </a:r>
                     </a:p>
                   </a:txBody>
                   <a:tcPr marL="71897" marR="71897" marT="35948" marB="35948"/>
@@ -9590,136 +9383,6 @@
           </a:graphicData>
         </a:graphic>
       </p:graphicFrame>
-      <p:sp>
-        <p:nvSpPr>
-          <p:cNvPr id="12" name="Arrow: Right 11">
-            <a:extLst>
-              <a:ext uri="{FF2B5EF4-FFF2-40B4-BE49-F238E27FC236}">
-                <a16:creationId xmlns:a16="http://schemas.microsoft.com/office/drawing/2014/main" id="{7662C08C-246A-4603-8E10-636570382995}"/>
-              </a:ext>
-            </a:extLst>
-          </p:cNvPr>
-          <p:cNvSpPr/>
-          <p:nvPr/>
-        </p:nvSpPr>
-        <p:spPr>
-          <a:xfrm>
-            <a:off x="9567530" y="2757508"/>
-            <a:ext cx="574158" cy="584775"/>
-          </a:xfrm>
-          <a:prstGeom prst="rightArrow">
-            <a:avLst/>
-          </a:prstGeom>
-        </p:spPr>
-        <p:style>
-          <a:lnRef idx="2">
-            <a:schemeClr val="dk1">
-              <a:shade val="50000"/>
-            </a:schemeClr>
-          </a:lnRef>
-          <a:fillRef idx="1">
-            <a:schemeClr val="dk1"/>
-          </a:fillRef>
-          <a:effectRef idx="0">
-            <a:schemeClr val="dk1"/>
-          </a:effectRef>
-          <a:fontRef idx="minor">
-            <a:schemeClr val="lt1"/>
-          </a:fontRef>
-        </p:style>
-        <p:txBody>
-          <a:bodyPr rtlCol="0" anchor="ctr"/>
-          <a:lstStyle/>
-          <a:p>
-            <a:pPr algn="ctr"/>
-            <a:endParaRPr lang="en-GB"/>
-          </a:p>
-        </p:txBody>
-      </p:sp>
-      <p:sp>
-        <p:nvSpPr>
-          <p:cNvPr id="13" name="Arrow: Right 12">
-            <a:extLst>
-              <a:ext uri="{FF2B5EF4-FFF2-40B4-BE49-F238E27FC236}">
-                <a16:creationId xmlns:a16="http://schemas.microsoft.com/office/drawing/2014/main" id="{AE2F46F4-21E5-4347-87EE-E13AB33F31E7}"/>
-              </a:ext>
-            </a:extLst>
-          </p:cNvPr>
-          <p:cNvSpPr/>
-          <p:nvPr/>
-        </p:nvSpPr>
-        <p:spPr>
-          <a:xfrm rot="10800000">
-            <a:off x="1913274" y="2674113"/>
-            <a:ext cx="574158" cy="584775"/>
-          </a:xfrm>
-          <a:prstGeom prst="rightArrow">
-            <a:avLst/>
-          </a:prstGeom>
-        </p:spPr>
-        <p:style>
-          <a:lnRef idx="2">
-            <a:schemeClr val="dk1">
-              <a:shade val="50000"/>
-            </a:schemeClr>
-          </a:lnRef>
-          <a:fillRef idx="1">
-            <a:schemeClr val="dk1"/>
-          </a:fillRef>
-          <a:effectRef idx="0">
-            <a:schemeClr val="dk1"/>
-          </a:effectRef>
-          <a:fontRef idx="minor">
-            <a:schemeClr val="lt1"/>
-          </a:fontRef>
-        </p:style>
-        <p:txBody>
-          <a:bodyPr rtlCol="0" anchor="ctr"/>
-          <a:lstStyle/>
-          <a:p>
-            <a:pPr algn="ctr"/>
-            <a:endParaRPr lang="en-GB"/>
-          </a:p>
-        </p:txBody>
-      </p:sp>
-      <p:sp>
-        <p:nvSpPr>
-          <p:cNvPr id="14" name="TextBox 13">
-            <a:extLst>
-              <a:ext uri="{FF2B5EF4-FFF2-40B4-BE49-F238E27FC236}">
-                <a16:creationId xmlns:a16="http://schemas.microsoft.com/office/drawing/2014/main" id="{686AA822-0CB4-400F-A1DA-69715FAF8F8F}"/>
-              </a:ext>
-            </a:extLst>
-          </p:cNvPr>
-          <p:cNvSpPr txBox="1"/>
-          <p:nvPr/>
-        </p:nvSpPr>
-        <p:spPr>
-          <a:xfrm>
-            <a:off x="3848985" y="5114085"/>
-            <a:ext cx="5192234" cy="584775"/>
-          </a:xfrm>
-          <a:prstGeom prst="rect">
-            <a:avLst/>
-          </a:prstGeom>
-          <a:noFill/>
-        </p:spPr>
-        <p:txBody>
-          <a:bodyPr wrap="square" rtlCol="0">
-            <a:spAutoFit/>
-          </a:bodyPr>
-          <a:lstStyle/>
-          <a:p>
-            <a:r>
-              <a:rPr lang="en-GB" sz="1600" dirty="0"/>
-              <a:t>Use arrows to look at previous or future bookings</a:t>
-            </a:r>
-          </a:p>
-          <a:p>
-            <a:endParaRPr lang="en-GB" sz="1600" dirty="0"/>
-          </a:p>
-        </p:txBody>
-      </p:sp>
     </p:spTree>
     <p:extLst>
       <p:ext uri="{BB962C8B-B14F-4D97-AF65-F5344CB8AC3E}">

</xml_diff>